<commit_message>
added initial dashboard sketch
</commit_message>
<xml_diff>
--- a/Proposal_pptx.pptx
+++ b/Proposal_pptx.pptx
@@ -105,6 +105,11 @@
       </a:defRPr>
     </a:lvl9pPr>
   </p:defaultTextStyle>
+  <p:extLst>
+    <p:ext uri="{EFAFB233-063F-42B5-8137-9DF3F51BA10A}">
+      <p15:sldGuideLst xmlns:p15="http://schemas.microsoft.com/office/powerpoint/2012/main"/>
+    </p:ext>
+  </p:extLst>
 </p:presentation>
 </file>
 
@@ -239,7 +244,7 @@
           <a:p>
             <a:fld id="{C2A9721D-93EC-4BEC-8E5E-788721CA9D8A}" type="datetimeFigureOut">
               <a:rPr lang="en-US" smtClean="0"/>
-              <a:t>9/29/2020</a:t>
+              <a:t>10/3/2020</a:t>
             </a:fld>
             <a:endParaRPr lang="en-US"/>
           </a:p>
@@ -409,7 +414,7 @@
           <a:p>
             <a:fld id="{C2A9721D-93EC-4BEC-8E5E-788721CA9D8A}" type="datetimeFigureOut">
               <a:rPr lang="en-US" smtClean="0"/>
-              <a:t>9/29/2020</a:t>
+              <a:t>10/3/2020</a:t>
             </a:fld>
             <a:endParaRPr lang="en-US"/>
           </a:p>
@@ -589,7 +594,7 @@
           <a:p>
             <a:fld id="{C2A9721D-93EC-4BEC-8E5E-788721CA9D8A}" type="datetimeFigureOut">
               <a:rPr lang="en-US" smtClean="0"/>
-              <a:t>9/29/2020</a:t>
+              <a:t>10/3/2020</a:t>
             </a:fld>
             <a:endParaRPr lang="en-US"/>
           </a:p>
@@ -759,7 +764,7 @@
           <a:p>
             <a:fld id="{C2A9721D-93EC-4BEC-8E5E-788721CA9D8A}" type="datetimeFigureOut">
               <a:rPr lang="en-US" smtClean="0"/>
-              <a:t>9/29/2020</a:t>
+              <a:t>10/3/2020</a:t>
             </a:fld>
             <a:endParaRPr lang="en-US"/>
           </a:p>
@@ -1003,7 +1008,7 @@
           <a:p>
             <a:fld id="{C2A9721D-93EC-4BEC-8E5E-788721CA9D8A}" type="datetimeFigureOut">
               <a:rPr lang="en-US" smtClean="0"/>
-              <a:t>9/29/2020</a:t>
+              <a:t>10/3/2020</a:t>
             </a:fld>
             <a:endParaRPr lang="en-US"/>
           </a:p>
@@ -1235,7 +1240,7 @@
           <a:p>
             <a:fld id="{C2A9721D-93EC-4BEC-8E5E-788721CA9D8A}" type="datetimeFigureOut">
               <a:rPr lang="en-US" smtClean="0"/>
-              <a:t>9/29/2020</a:t>
+              <a:t>10/3/2020</a:t>
             </a:fld>
             <a:endParaRPr lang="en-US"/>
           </a:p>
@@ -1602,7 +1607,7 @@
           <a:p>
             <a:fld id="{C2A9721D-93EC-4BEC-8E5E-788721CA9D8A}" type="datetimeFigureOut">
               <a:rPr lang="en-US" smtClean="0"/>
-              <a:t>9/29/2020</a:t>
+              <a:t>10/3/2020</a:t>
             </a:fld>
             <a:endParaRPr lang="en-US"/>
           </a:p>
@@ -1720,7 +1725,7 @@
           <a:p>
             <a:fld id="{C2A9721D-93EC-4BEC-8E5E-788721CA9D8A}" type="datetimeFigureOut">
               <a:rPr lang="en-US" smtClean="0"/>
-              <a:t>9/29/2020</a:t>
+              <a:t>10/3/2020</a:t>
             </a:fld>
             <a:endParaRPr lang="en-US"/>
           </a:p>
@@ -1815,7 +1820,7 @@
           <a:p>
             <a:fld id="{C2A9721D-93EC-4BEC-8E5E-788721CA9D8A}" type="datetimeFigureOut">
               <a:rPr lang="en-US" smtClean="0"/>
-              <a:t>9/29/2020</a:t>
+              <a:t>10/3/2020</a:t>
             </a:fld>
             <a:endParaRPr lang="en-US"/>
           </a:p>
@@ -2092,7 +2097,7 @@
           <a:p>
             <a:fld id="{C2A9721D-93EC-4BEC-8E5E-788721CA9D8A}" type="datetimeFigureOut">
               <a:rPr lang="en-US" smtClean="0"/>
-              <a:t>9/29/2020</a:t>
+              <a:t>10/3/2020</a:t>
             </a:fld>
             <a:endParaRPr lang="en-US"/>
           </a:p>
@@ -2349,7 +2354,7 @@
           <a:p>
             <a:fld id="{C2A9721D-93EC-4BEC-8E5E-788721CA9D8A}" type="datetimeFigureOut">
               <a:rPr lang="en-US" smtClean="0"/>
-              <a:t>9/29/2020</a:t>
+              <a:t>10/3/2020</a:t>
             </a:fld>
             <a:endParaRPr lang="en-US"/>
           </a:p>
@@ -2562,7 +2567,7 @@
           <a:p>
             <a:fld id="{C2A9721D-93EC-4BEC-8E5E-788721CA9D8A}" type="datetimeFigureOut">
               <a:rPr lang="en-US" smtClean="0"/>
-              <a:t>9/29/2020</a:t>
+              <a:t>10/3/2020</a:t>
             </a:fld>
             <a:endParaRPr lang="en-US"/>
           </a:p>
@@ -2977,73 +2982,461 @@
       </p:grpSpPr>
       <p:sp>
         <p:nvSpPr>
-          <p:cNvPr id="2" name="Title 1">
+          <p:cNvPr id="4" name="Rectangle 3">
             <a:extLst>
               <a:ext uri="{FF2B5EF4-FFF2-40B4-BE49-F238E27FC236}">
-                <a16:creationId xmlns:a16="http://schemas.microsoft.com/office/drawing/2014/main" id="{91469428-E4B4-4888-A108-88B35ECADEB6}"/>
+                <a16:creationId xmlns:a16="http://schemas.microsoft.com/office/drawing/2014/main" id="{11768CC9-8B98-4C33-BB92-44A244AF3AD6}"/>
               </a:ext>
             </a:extLst>
           </p:cNvPr>
-          <p:cNvSpPr>
-            <a:spLocks noGrp="1"/>
-          </p:cNvSpPr>
-          <p:nvPr>
-            <p:ph type="ctrTitle"/>
-          </p:nvPr>
+          <p:cNvSpPr/>
+          <p:nvPr/>
         </p:nvSpPr>
         <p:spPr>
           <a:xfrm>
-            <a:off x="3540376" y="4628754"/>
-            <a:ext cx="5721167" cy="2507314"/>
+            <a:off x="360947" y="1183377"/>
+            <a:ext cx="12071685" cy="1989221"/>
           </a:xfrm>
+          <a:prstGeom prst="rect">
+            <a:avLst/>
+          </a:prstGeom>
+          <a:solidFill>
+            <a:schemeClr val="tx1">
+              <a:lumMod val="65000"/>
+              <a:lumOff val="35000"/>
+            </a:schemeClr>
+          </a:solidFill>
         </p:spPr>
-        <p:txBody>
-          <a:bodyPr anchor="b">
-            <a:normAutofit/>
-          </a:bodyPr>
-          <a:lstStyle/>
-          <a:p>
-            <a:endParaRPr lang="en-US" sz="5460">
-              <a:solidFill>
-                <a:schemeClr val="tx2"/>
-              </a:solidFill>
-            </a:endParaRPr>
-          </a:p>
-        </p:txBody>
-      </p:sp>
-      <p:sp>
-        <p:nvSpPr>
-          <p:cNvPr id="3" name="Subtitle 2">
+        <p:style>
+          <a:lnRef idx="2">
+            <a:schemeClr val="accent1">
+              <a:shade val="50000"/>
+            </a:schemeClr>
+          </a:lnRef>
+          <a:fillRef idx="1">
+            <a:schemeClr val="accent1"/>
+          </a:fillRef>
+          <a:effectRef idx="0">
+            <a:schemeClr val="accent1"/>
+          </a:effectRef>
+          <a:fontRef idx="minor">
+            <a:schemeClr val="lt1"/>
+          </a:fontRef>
+        </p:style>
+        <p:txBody>
+          <a:bodyPr rtlCol="0" anchor="ctr"/>
+          <a:lstStyle/>
+          <a:p>
+            <a:pPr algn="ctr"/>
+            <a:r>
+              <a:rPr lang="en-US" sz="4000" dirty="0"/>
+              <a:t>Menu bar</a:t>
+            </a:r>
+          </a:p>
+          <a:p>
+            <a:pPr algn="ctr"/>
+            <a:r>
+              <a:rPr lang="en-US" sz="4000" dirty="0"/>
+              <a:t>Filter: (1) State (2) County</a:t>
+            </a:r>
+          </a:p>
+        </p:txBody>
+      </p:sp>
+      <p:sp>
+        <p:nvSpPr>
+          <p:cNvPr id="5" name="Rectangle 4">
             <a:extLst>
               <a:ext uri="{FF2B5EF4-FFF2-40B4-BE49-F238E27FC236}">
-                <a16:creationId xmlns:a16="http://schemas.microsoft.com/office/drawing/2014/main" id="{F85A2EAB-B3B6-470D-8E9D-B83796D34196}"/>
+                <a16:creationId xmlns:a16="http://schemas.microsoft.com/office/drawing/2014/main" id="{76D1C71C-2E1F-41C2-914B-604E6CE77764}"/>
               </a:ext>
             </a:extLst>
           </p:cNvPr>
-          <p:cNvSpPr>
-            <a:spLocks noGrp="1"/>
-          </p:cNvSpPr>
-          <p:nvPr>
-            <p:ph type="subTitle" idx="1"/>
-          </p:nvPr>
+          <p:cNvSpPr/>
+          <p:nvPr/>
         </p:nvSpPr>
         <p:spPr>
           <a:xfrm>
-            <a:off x="3539719" y="7210899"/>
-            <a:ext cx="5722481" cy="716183"/>
+            <a:off x="360948" y="3545304"/>
+            <a:ext cx="6745705" cy="8357938"/>
           </a:xfrm>
+          <a:prstGeom prst="rect">
+            <a:avLst/>
+          </a:prstGeom>
+          <a:ln>
+            <a:solidFill>
+              <a:schemeClr val="accent1"/>
+            </a:solidFill>
+          </a:ln>
         </p:spPr>
-        <p:txBody>
-          <a:bodyPr>
-            <a:normAutofit/>
+        <p:style>
+          <a:lnRef idx="2">
+            <a:schemeClr val="accent1">
+              <a:shade val="50000"/>
+            </a:schemeClr>
+          </a:lnRef>
+          <a:fillRef idx="1">
+            <a:schemeClr val="accent1"/>
+          </a:fillRef>
+          <a:effectRef idx="0">
+            <a:schemeClr val="accent1"/>
+          </a:effectRef>
+          <a:fontRef idx="minor">
+            <a:schemeClr val="lt1"/>
+          </a:fontRef>
+        </p:style>
+        <p:txBody>
+          <a:bodyPr rtlCol="0" anchor="ctr"/>
+          <a:lstStyle/>
+          <a:p>
+            <a:pPr algn="ctr"/>
+            <a:r>
+              <a:rPr lang="en-US" sz="4000" dirty="0"/>
+              <a:t>FL MAP (67 counties)</a:t>
+            </a:r>
+          </a:p>
+          <a:p>
+            <a:pPr algn="ctr"/>
+            <a:endParaRPr lang="en-US" sz="4000" dirty="0"/>
+          </a:p>
+          <a:p>
+            <a:pPr algn="ctr"/>
+            <a:r>
+              <a:rPr lang="en-US" sz="4000" dirty="0"/>
+              <a:t>Layers of median income</a:t>
+            </a:r>
+          </a:p>
+          <a:p>
+            <a:pPr algn="ctr"/>
+            <a:r>
+              <a:rPr lang="en-US" sz="4000" dirty="0"/>
+              <a:t>Index score</a:t>
+            </a:r>
+          </a:p>
+          <a:p>
+            <a:pPr algn="ctr"/>
+            <a:r>
+              <a:rPr lang="en-US" sz="4000" dirty="0"/>
+              <a:t>Uninsured pop %</a:t>
+            </a:r>
+          </a:p>
+          <a:p>
+            <a:pPr algn="ctr"/>
+            <a:r>
+              <a:rPr lang="en-US" sz="4000" dirty="0"/>
+              <a:t>Poor health days</a:t>
+            </a:r>
+          </a:p>
+          <a:p>
+            <a:pPr algn="ctr"/>
+            <a:r>
+              <a:rPr lang="en-US" sz="4000" dirty="0"/>
+              <a:t>Median income</a:t>
+            </a:r>
+          </a:p>
+          <a:p>
+            <a:pPr algn="ctr"/>
+            <a:endParaRPr lang="en-US" sz="4000" dirty="0"/>
+          </a:p>
+          <a:p>
+            <a:pPr algn="ctr"/>
+            <a:r>
+              <a:rPr lang="en-US" sz="4000" dirty="0"/>
+              <a:t> </a:t>
+            </a:r>
+          </a:p>
+        </p:txBody>
+      </p:sp>
+      <p:sp>
+        <p:nvSpPr>
+          <p:cNvPr id="6" name="TextBox 5">
+            <a:extLst>
+              <a:ext uri="{FF2B5EF4-FFF2-40B4-BE49-F238E27FC236}">
+                <a16:creationId xmlns:a16="http://schemas.microsoft.com/office/drawing/2014/main" id="{A2FB2112-DA3A-45D1-A95B-2253F32AC97C}"/>
+              </a:ext>
+            </a:extLst>
+          </p:cNvPr>
+          <p:cNvSpPr txBox="1"/>
+          <p:nvPr/>
+        </p:nvSpPr>
+        <p:spPr>
+          <a:xfrm>
+            <a:off x="128336" y="0"/>
+            <a:ext cx="2806730" cy="553998"/>
+          </a:xfrm>
+          <a:prstGeom prst="rect">
+            <a:avLst/>
+          </a:prstGeom>
+          <a:noFill/>
+        </p:spPr>
+        <p:txBody>
+          <a:bodyPr wrap="none" rtlCol="0">
+            <a:spAutoFit/>
           </a:bodyPr>
           <a:lstStyle/>
           <a:p>
-            <a:endParaRPr lang="en-US">
-              <a:solidFill>
-                <a:schemeClr val="tx2"/>
-              </a:solidFill>
-            </a:endParaRPr>
+            <a:r>
+              <a:rPr lang="en-US" sz="3000" dirty="0"/>
+              <a:t>Initial dashboard</a:t>
+            </a:r>
+          </a:p>
+        </p:txBody>
+      </p:sp>
+      <p:sp>
+        <p:nvSpPr>
+          <p:cNvPr id="7" name="Rectangle 6">
+            <a:extLst>
+              <a:ext uri="{FF2B5EF4-FFF2-40B4-BE49-F238E27FC236}">
+                <a16:creationId xmlns:a16="http://schemas.microsoft.com/office/drawing/2014/main" id="{700A9487-4162-4425-94F4-B8872554000B}"/>
+              </a:ext>
+            </a:extLst>
+          </p:cNvPr>
+          <p:cNvSpPr/>
+          <p:nvPr/>
+        </p:nvSpPr>
+        <p:spPr>
+          <a:xfrm>
+            <a:off x="7471611" y="7169224"/>
+            <a:ext cx="4780546" cy="4734018"/>
+          </a:xfrm>
+          <a:prstGeom prst="rect">
+            <a:avLst/>
+          </a:prstGeom>
+          <a:solidFill>
+            <a:schemeClr val="accent4"/>
+          </a:solidFill>
+          <a:ln>
+            <a:solidFill>
+              <a:schemeClr val="accent4"/>
+            </a:solidFill>
+          </a:ln>
+        </p:spPr>
+        <p:style>
+          <a:lnRef idx="2">
+            <a:schemeClr val="accent1">
+              <a:shade val="50000"/>
+            </a:schemeClr>
+          </a:lnRef>
+          <a:fillRef idx="1">
+            <a:schemeClr val="accent1"/>
+          </a:fillRef>
+          <a:effectRef idx="0">
+            <a:schemeClr val="accent1"/>
+          </a:effectRef>
+          <a:fontRef idx="minor">
+            <a:schemeClr val="lt1"/>
+          </a:fontRef>
+        </p:style>
+        <p:txBody>
+          <a:bodyPr rtlCol="0" anchor="ctr"/>
+          <a:lstStyle/>
+          <a:p>
+            <a:pPr algn="ctr"/>
+            <a:r>
+              <a:rPr lang="en-US" sz="4000" dirty="0"/>
+              <a:t>D3 scatter plot </a:t>
+            </a:r>
+          </a:p>
+          <a:p>
+            <a:pPr algn="ctr"/>
+            <a:r>
+              <a:rPr lang="en-US" sz="4000" dirty="0"/>
+              <a:t>(Y) death rate</a:t>
+            </a:r>
+          </a:p>
+          <a:p>
+            <a:pPr algn="ctr"/>
+            <a:r>
+              <a:rPr lang="en-US" sz="4000" dirty="0"/>
+              <a:t>Vs </a:t>
+            </a:r>
+          </a:p>
+          <a:p>
+            <a:pPr algn="ctr"/>
+            <a:r>
+              <a:rPr lang="en-US" sz="4000" dirty="0"/>
+              <a:t>Uninsured pop%</a:t>
+            </a:r>
+          </a:p>
+          <a:p>
+            <a:pPr algn="ctr"/>
+            <a:r>
+              <a:rPr lang="en-US" sz="4000" dirty="0"/>
+              <a:t>Poor health days</a:t>
+            </a:r>
+          </a:p>
+          <a:p>
+            <a:pPr algn="ctr"/>
+            <a:r>
+              <a:rPr lang="en-US" sz="4000" dirty="0"/>
+              <a:t>Median income (linear regression)</a:t>
+            </a:r>
+          </a:p>
+          <a:p>
+            <a:pPr algn="ctr"/>
+            <a:endParaRPr lang="en-US" sz="4000" dirty="0"/>
+          </a:p>
+        </p:txBody>
+      </p:sp>
+      <p:sp>
+        <p:nvSpPr>
+          <p:cNvPr id="9" name="Rectangle 8">
+            <a:extLst>
+              <a:ext uri="{FF2B5EF4-FFF2-40B4-BE49-F238E27FC236}">
+                <a16:creationId xmlns:a16="http://schemas.microsoft.com/office/drawing/2014/main" id="{271239C0-AACC-4BB3-AB29-A81902585089}"/>
+              </a:ext>
+            </a:extLst>
+          </p:cNvPr>
+          <p:cNvSpPr/>
+          <p:nvPr/>
+        </p:nvSpPr>
+        <p:spPr>
+          <a:xfrm>
+            <a:off x="7551820" y="5299729"/>
+            <a:ext cx="4700337" cy="1636295"/>
+          </a:xfrm>
+          <a:prstGeom prst="rect">
+            <a:avLst/>
+          </a:prstGeom>
+          <a:solidFill>
+            <a:srgbClr val="7030A0"/>
+          </a:solidFill>
+          <a:ln>
+            <a:solidFill>
+              <a:srgbClr val="7030A0"/>
+            </a:solidFill>
+          </a:ln>
+        </p:spPr>
+        <p:style>
+          <a:lnRef idx="2">
+            <a:schemeClr val="accent1">
+              <a:shade val="50000"/>
+            </a:schemeClr>
+          </a:lnRef>
+          <a:fillRef idx="1">
+            <a:schemeClr val="accent1"/>
+          </a:fillRef>
+          <a:effectRef idx="0">
+            <a:schemeClr val="accent1"/>
+          </a:effectRef>
+          <a:fontRef idx="minor">
+            <a:schemeClr val="lt1"/>
+          </a:fontRef>
+        </p:style>
+        <p:txBody>
+          <a:bodyPr rtlCol="0" anchor="ctr"/>
+          <a:lstStyle/>
+          <a:p>
+            <a:pPr algn="ctr"/>
+            <a:r>
+              <a:rPr lang="en-US" sz="4000" dirty="0"/>
+              <a:t>Gauge chart</a:t>
+            </a:r>
+          </a:p>
+          <a:p>
+            <a:pPr algn="ctr"/>
+            <a:r>
+              <a:rPr lang="en-US" sz="4000" dirty="0"/>
+              <a:t>County v score</a:t>
+            </a:r>
+          </a:p>
+        </p:txBody>
+      </p:sp>
+      <p:sp>
+        <p:nvSpPr>
+          <p:cNvPr id="11" name="Rectangle 10">
+            <a:extLst>
+              <a:ext uri="{FF2B5EF4-FFF2-40B4-BE49-F238E27FC236}">
+                <a16:creationId xmlns:a16="http://schemas.microsoft.com/office/drawing/2014/main" id="{9864C042-2179-45E5-A455-25BFD5971063}"/>
+              </a:ext>
+            </a:extLst>
+          </p:cNvPr>
+          <p:cNvSpPr/>
+          <p:nvPr/>
+        </p:nvSpPr>
+        <p:spPr>
+          <a:xfrm>
+            <a:off x="7511715" y="3418016"/>
+            <a:ext cx="4700337" cy="1636295"/>
+          </a:xfrm>
+          <a:prstGeom prst="rect">
+            <a:avLst/>
+          </a:prstGeom>
+          <a:solidFill>
+            <a:srgbClr val="7030A0"/>
+          </a:solidFill>
+          <a:ln>
+            <a:solidFill>
+              <a:srgbClr val="7030A0"/>
+            </a:solidFill>
+          </a:ln>
+        </p:spPr>
+        <p:style>
+          <a:lnRef idx="2">
+            <a:schemeClr val="accent1">
+              <a:shade val="50000"/>
+            </a:schemeClr>
+          </a:lnRef>
+          <a:fillRef idx="1">
+            <a:schemeClr val="accent1"/>
+          </a:fillRef>
+          <a:effectRef idx="0">
+            <a:schemeClr val="accent1"/>
+          </a:effectRef>
+          <a:fontRef idx="minor">
+            <a:schemeClr val="lt1"/>
+          </a:fontRef>
+        </p:style>
+        <p:txBody>
+          <a:bodyPr rtlCol="0" anchor="ctr"/>
+          <a:lstStyle/>
+          <a:p>
+            <a:pPr algn="ctr"/>
+            <a:r>
+              <a:rPr lang="en-US" sz="4000" dirty="0"/>
+              <a:t>Gauge chart</a:t>
+            </a:r>
+          </a:p>
+          <a:p>
+            <a:pPr algn="ctr"/>
+            <a:r>
+              <a:rPr lang="en-US" sz="4000" dirty="0"/>
+              <a:t>FL v score</a:t>
+            </a:r>
+          </a:p>
+        </p:txBody>
+      </p:sp>
+      <p:sp>
+        <p:nvSpPr>
+          <p:cNvPr id="14" name="TextBox 13">
+            <a:extLst>
+              <a:ext uri="{FF2B5EF4-FFF2-40B4-BE49-F238E27FC236}">
+                <a16:creationId xmlns:a16="http://schemas.microsoft.com/office/drawing/2014/main" id="{E91B6D85-B5E5-4F74-BE40-904ECC46068C}"/>
+              </a:ext>
+            </a:extLst>
+          </p:cNvPr>
+          <p:cNvSpPr txBox="1"/>
+          <p:nvPr/>
+        </p:nvSpPr>
+        <p:spPr>
+          <a:xfrm>
+            <a:off x="7808815" y="37691"/>
+            <a:ext cx="4992785" cy="553998"/>
+          </a:xfrm>
+          <a:prstGeom prst="rect">
+            <a:avLst/>
+          </a:prstGeom>
+          <a:noFill/>
+        </p:spPr>
+        <p:txBody>
+          <a:bodyPr wrap="square" rtlCol="0">
+            <a:spAutoFit/>
+          </a:bodyPr>
+          <a:lstStyle/>
+          <a:p>
+            <a:r>
+              <a:rPr lang="en-US" sz="3000" dirty="0"/>
+              <a:t>Add-ons: Responsive features</a:t>
+            </a:r>
           </a:p>
         </p:txBody>
       </p:sp>

</xml_diff>